<commit_message>
Wrote basic skeleton for background and registration chapters
</commit_message>
<xml_diff>
--- a/Figures/FigureConstruction/FigureConstruction.pptx
+++ b/Figures/FigureConstruction/FigureConstruction.pptx
@@ -6,6 +6,7 @@
   </p:sldMasterIdLst>
   <p:sldIdLst>
     <p:sldId id="256" r:id="rId2"/>
+    <p:sldId id="257" r:id="rId3"/>
   </p:sldIdLst>
   <p:sldSz cx="12192000" cy="6858000"/>
   <p:notesSz cx="6858000" cy="9144000"/>
@@ -104,6 +105,11 @@
       </a:defRPr>
     </a:lvl9pPr>
   </p:defaultTextStyle>
+  <p:extLst>
+    <p:ext uri="{EFAFB233-063F-42B5-8137-9DF3F51BA10A}">
+      <p15:sldGuideLst xmlns:p15="http://schemas.microsoft.com/office/powerpoint/2012/main"/>
+    </p:ext>
+  </p:extLst>
 </p:presentation>
 </file>
 
@@ -238,7 +244,7 @@
           <a:p>
             <a:fld id="{4829810A-402A-4B85-A446-726E8675BF09}" type="datetimeFigureOut">
               <a:rPr lang="en-US" smtClean="0"/>
-              <a:t>30-Nov-17</a:t>
+              <a:t>22-Jan-18</a:t>
             </a:fld>
             <a:endParaRPr lang="en-US"/>
           </a:p>
@@ -408,7 +414,7 @@
           <a:p>
             <a:fld id="{4829810A-402A-4B85-A446-726E8675BF09}" type="datetimeFigureOut">
               <a:rPr lang="en-US" smtClean="0"/>
-              <a:t>30-Nov-17</a:t>
+              <a:t>22-Jan-18</a:t>
             </a:fld>
             <a:endParaRPr lang="en-US"/>
           </a:p>
@@ -588,7 +594,7 @@
           <a:p>
             <a:fld id="{4829810A-402A-4B85-A446-726E8675BF09}" type="datetimeFigureOut">
               <a:rPr lang="en-US" smtClean="0"/>
-              <a:t>30-Nov-17</a:t>
+              <a:t>22-Jan-18</a:t>
             </a:fld>
             <a:endParaRPr lang="en-US"/>
           </a:p>
@@ -758,7 +764,7 @@
           <a:p>
             <a:fld id="{4829810A-402A-4B85-A446-726E8675BF09}" type="datetimeFigureOut">
               <a:rPr lang="en-US" smtClean="0"/>
-              <a:t>30-Nov-17</a:t>
+              <a:t>22-Jan-18</a:t>
             </a:fld>
             <a:endParaRPr lang="en-US"/>
           </a:p>
@@ -1004,7 +1010,7 @@
           <a:p>
             <a:fld id="{4829810A-402A-4B85-A446-726E8675BF09}" type="datetimeFigureOut">
               <a:rPr lang="en-US" smtClean="0"/>
-              <a:t>30-Nov-17</a:t>
+              <a:t>22-Jan-18</a:t>
             </a:fld>
             <a:endParaRPr lang="en-US"/>
           </a:p>
@@ -1236,7 +1242,7 @@
           <a:p>
             <a:fld id="{4829810A-402A-4B85-A446-726E8675BF09}" type="datetimeFigureOut">
               <a:rPr lang="en-US" smtClean="0"/>
-              <a:t>30-Nov-17</a:t>
+              <a:t>22-Jan-18</a:t>
             </a:fld>
             <a:endParaRPr lang="en-US"/>
           </a:p>
@@ -1603,7 +1609,7 @@
           <a:p>
             <a:fld id="{4829810A-402A-4B85-A446-726E8675BF09}" type="datetimeFigureOut">
               <a:rPr lang="en-US" smtClean="0"/>
-              <a:t>30-Nov-17</a:t>
+              <a:t>22-Jan-18</a:t>
             </a:fld>
             <a:endParaRPr lang="en-US"/>
           </a:p>
@@ -1721,7 +1727,7 @@
           <a:p>
             <a:fld id="{4829810A-402A-4B85-A446-726E8675BF09}" type="datetimeFigureOut">
               <a:rPr lang="en-US" smtClean="0"/>
-              <a:t>30-Nov-17</a:t>
+              <a:t>22-Jan-18</a:t>
             </a:fld>
             <a:endParaRPr lang="en-US"/>
           </a:p>
@@ -1816,7 +1822,7 @@
           <a:p>
             <a:fld id="{4829810A-402A-4B85-A446-726E8675BF09}" type="datetimeFigureOut">
               <a:rPr lang="en-US" smtClean="0"/>
-              <a:t>30-Nov-17</a:t>
+              <a:t>22-Jan-18</a:t>
             </a:fld>
             <a:endParaRPr lang="en-US"/>
           </a:p>
@@ -2093,7 +2099,7 @@
           <a:p>
             <a:fld id="{4829810A-402A-4B85-A446-726E8675BF09}" type="datetimeFigureOut">
               <a:rPr lang="en-US" smtClean="0"/>
-              <a:t>30-Nov-17</a:t>
+              <a:t>22-Jan-18</a:t>
             </a:fld>
             <a:endParaRPr lang="en-US"/>
           </a:p>
@@ -2346,7 +2352,7 @@
           <a:p>
             <a:fld id="{4829810A-402A-4B85-A446-726E8675BF09}" type="datetimeFigureOut">
               <a:rPr lang="en-US" smtClean="0"/>
-              <a:t>30-Nov-17</a:t>
+              <a:t>22-Jan-18</a:t>
             </a:fld>
             <a:endParaRPr lang="en-US"/>
           </a:p>
@@ -2559,7 +2565,7 @@
           <a:p>
             <a:fld id="{4829810A-402A-4B85-A446-726E8675BF09}" type="datetimeFigureOut">
               <a:rPr lang="en-US" smtClean="0"/>
-              <a:t>30-Nov-17</a:t>
+              <a:t>22-Jan-18</a:t>
             </a:fld>
             <a:endParaRPr lang="en-US"/>
           </a:p>
@@ -3498,6 +3504,109 @@
 </p:sld>
 </file>
 
+<file path=ppt/slides/slide2.xml><?xml version="1.0" encoding="utf-8"?>
+<p:sld xmlns:a="http://schemas.openxmlformats.org/drawingml/2006/main" xmlns:r="http://schemas.openxmlformats.org/officeDocument/2006/relationships" xmlns:p="http://schemas.openxmlformats.org/presentationml/2006/main">
+  <p:cSld>
+    <p:spTree>
+      <p:nvGrpSpPr>
+        <p:cNvPr id="1" name=""/>
+        <p:cNvGrpSpPr/>
+        <p:nvPr/>
+      </p:nvGrpSpPr>
+      <p:grpSpPr>
+        <a:xfrm>
+          <a:off x="0" y="0"/>
+          <a:ext cx="0" cy="0"/>
+          <a:chOff x="0" y="0"/>
+          <a:chExt cx="0" cy="0"/>
+        </a:xfrm>
+      </p:grpSpPr>
+      <p:grpSp>
+        <p:nvGrpSpPr>
+          <p:cNvPr id="4" name="Group 3"/>
+          <p:cNvGrpSpPr/>
+          <p:nvPr/>
+        </p:nvGrpSpPr>
+        <p:grpSpPr>
+          <a:xfrm>
+            <a:off x="1773115" y="0"/>
+            <a:ext cx="8754208" cy="6858000"/>
+            <a:chOff x="1773115" y="0"/>
+            <a:chExt cx="8754208" cy="6858000"/>
+          </a:xfrm>
+        </p:grpSpPr>
+        <p:pic>
+          <p:nvPicPr>
+            <p:cNvPr id="2" name="Picture 1"/>
+            <p:cNvPicPr>
+              <a:picLocks noChangeAspect="1"/>
+            </p:cNvPicPr>
+            <p:nvPr/>
+          </p:nvPicPr>
+          <p:blipFill rotWithShape="1">
+            <a:blip r:embed="rId2">
+              <a:extLst>
+                <a:ext uri="{28A0092B-C50C-407E-A947-70E740481C1C}">
+                  <a14:useLocalDpi xmlns:a14="http://schemas.microsoft.com/office/drawing/2010/main" val="0"/>
+                </a:ext>
+              </a:extLst>
+            </a:blip>
+            <a:srcRect l="19559" r="19559"/>
+            <a:stretch/>
+          </p:blipFill>
+          <p:spPr>
+            <a:xfrm>
+              <a:off x="5574323" y="0"/>
+              <a:ext cx="4953000" cy="6858000"/>
+            </a:xfrm>
+            <a:prstGeom prst="rect">
+              <a:avLst/>
+            </a:prstGeom>
+          </p:spPr>
+        </p:pic>
+        <p:pic>
+          <p:nvPicPr>
+            <p:cNvPr id="3" name="Picture 2"/>
+            <p:cNvPicPr>
+              <a:picLocks noChangeAspect="1"/>
+            </p:cNvPicPr>
+            <p:nvPr/>
+          </p:nvPicPr>
+          <p:blipFill rotWithShape="1">
+            <a:blip r:embed="rId3">
+              <a:extLst>
+                <a:ext uri="{28A0092B-C50C-407E-A947-70E740481C1C}">
+                  <a14:useLocalDpi xmlns:a14="http://schemas.microsoft.com/office/drawing/2010/main" val="0"/>
+                </a:ext>
+              </a:extLst>
+            </a:blip>
+            <a:srcRect l="23774" r="29502"/>
+            <a:stretch/>
+          </p:blipFill>
+          <p:spPr>
+            <a:xfrm>
+              <a:off x="1773115" y="0"/>
+              <a:ext cx="3801208" cy="6858000"/>
+            </a:xfrm>
+            <a:prstGeom prst="rect">
+              <a:avLst/>
+            </a:prstGeom>
+          </p:spPr>
+        </p:pic>
+      </p:grpSp>
+    </p:spTree>
+    <p:extLst>
+      <p:ext uri="{BB962C8B-B14F-4D97-AF65-F5344CB8AC3E}">
+        <p14:creationId xmlns:p14="http://schemas.microsoft.com/office/powerpoint/2010/main" val="415994499"/>
+      </p:ext>
+    </p:extLst>
+  </p:cSld>
+  <p:clrMapOvr>
+    <a:masterClrMapping/>
+  </p:clrMapOvr>
+</p:sld>
+</file>
+
 <file path=ppt/theme/theme1.xml><?xml version="1.0" encoding="utf-8"?>
 <a:theme xmlns:a="http://schemas.openxmlformats.org/drawingml/2006/main" name="Office Theme">
   <a:themeElements>

</xml_diff>

<commit_message>
Wrote Ch 4 with detailed description of landmark repair methods
</commit_message>
<xml_diff>
--- a/Figures/FigureConstruction/FigureConstruction.pptx
+++ b/Figures/FigureConstruction/FigureConstruction.pptx
@@ -8,11 +8,16 @@
     <p:sldId id="258" r:id="rId2"/>
     <p:sldId id="263" r:id="rId3"/>
     <p:sldId id="256" r:id="rId4"/>
-    <p:sldId id="262" r:id="rId5"/>
-    <p:sldId id="259" r:id="rId6"/>
-    <p:sldId id="260" r:id="rId7"/>
-    <p:sldId id="261" r:id="rId8"/>
-    <p:sldId id="257" r:id="rId9"/>
+    <p:sldId id="264" r:id="rId5"/>
+    <p:sldId id="262" r:id="rId6"/>
+    <p:sldId id="259" r:id="rId7"/>
+    <p:sldId id="260" r:id="rId8"/>
+    <p:sldId id="261" r:id="rId9"/>
+    <p:sldId id="257" r:id="rId10"/>
+    <p:sldId id="265" r:id="rId11"/>
+    <p:sldId id="266" r:id="rId12"/>
+    <p:sldId id="267" r:id="rId13"/>
+    <p:sldId id="268" r:id="rId14"/>
   </p:sldIdLst>
   <p:sldSz cx="12192000" cy="6858000"/>
   <p:notesSz cx="6858000" cy="9144000"/>
@@ -250,7 +255,7 @@
           <a:p>
             <a:fld id="{4829810A-402A-4B85-A446-726E8675BF09}" type="datetimeFigureOut">
               <a:rPr lang="en-US" smtClean="0"/>
-              <a:t>05-Feb-18</a:t>
+              <a:t>16-Feb-18</a:t>
             </a:fld>
             <a:endParaRPr lang="en-US"/>
           </a:p>
@@ -420,7 +425,7 @@
           <a:p>
             <a:fld id="{4829810A-402A-4B85-A446-726E8675BF09}" type="datetimeFigureOut">
               <a:rPr lang="en-US" smtClean="0"/>
-              <a:t>05-Feb-18</a:t>
+              <a:t>16-Feb-18</a:t>
             </a:fld>
             <a:endParaRPr lang="en-US"/>
           </a:p>
@@ -600,7 +605,7 @@
           <a:p>
             <a:fld id="{4829810A-402A-4B85-A446-726E8675BF09}" type="datetimeFigureOut">
               <a:rPr lang="en-US" smtClean="0"/>
-              <a:t>05-Feb-18</a:t>
+              <a:t>16-Feb-18</a:t>
             </a:fld>
             <a:endParaRPr lang="en-US"/>
           </a:p>
@@ -770,7 +775,7 @@
           <a:p>
             <a:fld id="{4829810A-402A-4B85-A446-726E8675BF09}" type="datetimeFigureOut">
               <a:rPr lang="en-US" smtClean="0"/>
-              <a:t>05-Feb-18</a:t>
+              <a:t>16-Feb-18</a:t>
             </a:fld>
             <a:endParaRPr lang="en-US"/>
           </a:p>
@@ -1016,7 +1021,7 @@
           <a:p>
             <a:fld id="{4829810A-402A-4B85-A446-726E8675BF09}" type="datetimeFigureOut">
               <a:rPr lang="en-US" smtClean="0"/>
-              <a:t>05-Feb-18</a:t>
+              <a:t>16-Feb-18</a:t>
             </a:fld>
             <a:endParaRPr lang="en-US"/>
           </a:p>
@@ -1248,7 +1253,7 @@
           <a:p>
             <a:fld id="{4829810A-402A-4B85-A446-726E8675BF09}" type="datetimeFigureOut">
               <a:rPr lang="en-US" smtClean="0"/>
-              <a:t>05-Feb-18</a:t>
+              <a:t>16-Feb-18</a:t>
             </a:fld>
             <a:endParaRPr lang="en-US"/>
           </a:p>
@@ -1615,7 +1620,7 @@
           <a:p>
             <a:fld id="{4829810A-402A-4B85-A446-726E8675BF09}" type="datetimeFigureOut">
               <a:rPr lang="en-US" smtClean="0"/>
-              <a:t>05-Feb-18</a:t>
+              <a:t>16-Feb-18</a:t>
             </a:fld>
             <a:endParaRPr lang="en-US"/>
           </a:p>
@@ -1733,7 +1738,7 @@
           <a:p>
             <a:fld id="{4829810A-402A-4B85-A446-726E8675BF09}" type="datetimeFigureOut">
               <a:rPr lang="en-US" smtClean="0"/>
-              <a:t>05-Feb-18</a:t>
+              <a:t>16-Feb-18</a:t>
             </a:fld>
             <a:endParaRPr lang="en-US"/>
           </a:p>
@@ -1828,7 +1833,7 @@
           <a:p>
             <a:fld id="{4829810A-402A-4B85-A446-726E8675BF09}" type="datetimeFigureOut">
               <a:rPr lang="en-US" smtClean="0"/>
-              <a:t>05-Feb-18</a:t>
+              <a:t>16-Feb-18</a:t>
             </a:fld>
             <a:endParaRPr lang="en-US"/>
           </a:p>
@@ -2105,7 +2110,7 @@
           <a:p>
             <a:fld id="{4829810A-402A-4B85-A446-726E8675BF09}" type="datetimeFigureOut">
               <a:rPr lang="en-US" smtClean="0"/>
-              <a:t>05-Feb-18</a:t>
+              <a:t>16-Feb-18</a:t>
             </a:fld>
             <a:endParaRPr lang="en-US"/>
           </a:p>
@@ -2358,7 +2363,7 @@
           <a:p>
             <a:fld id="{4829810A-402A-4B85-A446-726E8675BF09}" type="datetimeFigureOut">
               <a:rPr lang="en-US" smtClean="0"/>
-              <a:t>05-Feb-18</a:t>
+              <a:t>16-Feb-18</a:t>
             </a:fld>
             <a:endParaRPr lang="en-US"/>
           </a:p>
@@ -2571,7 +2576,7 @@
           <a:p>
             <a:fld id="{4829810A-402A-4B85-A446-726E8675BF09}" type="datetimeFigureOut">
               <a:rPr lang="en-US" smtClean="0"/>
-              <a:t>05-Feb-18</a:t>
+              <a:t>16-Feb-18</a:t>
             </a:fld>
             <a:endParaRPr lang="en-US"/>
           </a:p>
@@ -3145,6 +3150,337 @@
   <p:clrMapOvr>
     <a:masterClrMapping/>
   </p:clrMapOvr>
+  <p:timing>
+    <p:tnLst>
+      <p:par>
+        <p:cTn id="1" dur="indefinite" restart="never" nodeType="tmRoot"/>
+      </p:par>
+    </p:tnLst>
+  </p:timing>
+</p:sld>
+</file>
+
+<file path=ppt/slides/slide10.xml><?xml version="1.0" encoding="utf-8"?>
+<p:sld xmlns:a="http://schemas.openxmlformats.org/drawingml/2006/main" xmlns:r="http://schemas.openxmlformats.org/officeDocument/2006/relationships" xmlns:p="http://schemas.openxmlformats.org/presentationml/2006/main">
+  <p:cSld>
+    <p:spTree>
+      <p:nvGrpSpPr>
+        <p:cNvPr id="1" name=""/>
+        <p:cNvGrpSpPr/>
+        <p:nvPr/>
+      </p:nvGrpSpPr>
+      <p:grpSpPr>
+        <a:xfrm>
+          <a:off x="0" y="0"/>
+          <a:ext cx="0" cy="0"/>
+          <a:chOff x="0" y="0"/>
+          <a:chExt cx="0" cy="0"/>
+        </a:xfrm>
+      </p:grpSpPr>
+      <p:grpSp>
+        <p:nvGrpSpPr>
+          <p:cNvPr id="4" name="Group 3"/>
+          <p:cNvGrpSpPr/>
+          <p:nvPr/>
+        </p:nvGrpSpPr>
+        <p:grpSpPr>
+          <a:xfrm>
+            <a:off x="3557953" y="0"/>
+            <a:ext cx="5720868" cy="6858000"/>
+            <a:chOff x="4569068" y="0"/>
+            <a:chExt cx="5720868" cy="6858000"/>
+          </a:xfrm>
+        </p:grpSpPr>
+        <p:pic>
+          <p:nvPicPr>
+            <p:cNvPr id="2" name="Picture 1"/>
+            <p:cNvPicPr>
+              <a:picLocks noChangeAspect="1"/>
+            </p:cNvPicPr>
+            <p:nvPr/>
+          </p:nvPicPr>
+          <p:blipFill rotWithShape="1">
+            <a:blip r:embed="rId2">
+              <a:extLst>
+                <a:ext uri="{28A0092B-C50C-407E-A947-70E740481C1C}">
+                  <a14:useLocalDpi xmlns:a14="http://schemas.microsoft.com/office/drawing/2010/main" val="0"/>
+                </a:ext>
+              </a:extLst>
+            </a:blip>
+            <a:srcRect l="30596" r="30596"/>
+            <a:stretch/>
+          </p:blipFill>
+          <p:spPr>
+            <a:xfrm>
+              <a:off x="4569068" y="0"/>
+              <a:ext cx="3053864" cy="6858000"/>
+            </a:xfrm>
+            <a:prstGeom prst="rect">
+              <a:avLst/>
+            </a:prstGeom>
+          </p:spPr>
+        </p:pic>
+        <p:pic>
+          <p:nvPicPr>
+            <p:cNvPr id="3" name="Picture 2"/>
+            <p:cNvPicPr>
+              <a:picLocks noChangeAspect="1"/>
+            </p:cNvPicPr>
+            <p:nvPr/>
+          </p:nvPicPr>
+          <p:blipFill rotWithShape="1">
+            <a:blip r:embed="rId3">
+              <a:extLst>
+                <a:ext uri="{28A0092B-C50C-407E-A947-70E740481C1C}">
+                  <a14:useLocalDpi xmlns:a14="http://schemas.microsoft.com/office/drawing/2010/main" val="0"/>
+                </a:ext>
+              </a:extLst>
+            </a:blip>
+            <a:srcRect l="33054" r="33054"/>
+            <a:stretch/>
+          </p:blipFill>
+          <p:spPr>
+            <a:xfrm>
+              <a:off x="7622932" y="0"/>
+              <a:ext cx="2667004" cy="6858000"/>
+            </a:xfrm>
+            <a:prstGeom prst="rect">
+              <a:avLst/>
+            </a:prstGeom>
+          </p:spPr>
+        </p:pic>
+      </p:grpSp>
+    </p:spTree>
+    <p:extLst>
+      <p:ext uri="{BB962C8B-B14F-4D97-AF65-F5344CB8AC3E}">
+        <p14:creationId xmlns:p14="http://schemas.microsoft.com/office/powerpoint/2010/main" val="3031521041"/>
+      </p:ext>
+    </p:extLst>
+  </p:cSld>
+  <p:clrMapOvr>
+    <a:masterClrMapping/>
+  </p:clrMapOvr>
+</p:sld>
+</file>
+
+<file path=ppt/slides/slide11.xml><?xml version="1.0" encoding="utf-8"?>
+<p:sld xmlns:a="http://schemas.openxmlformats.org/drawingml/2006/main" xmlns:r="http://schemas.openxmlformats.org/officeDocument/2006/relationships" xmlns:p="http://schemas.openxmlformats.org/presentationml/2006/main">
+  <p:cSld>
+    <p:spTree>
+      <p:nvGrpSpPr>
+        <p:cNvPr id="1" name=""/>
+        <p:cNvGrpSpPr/>
+        <p:nvPr/>
+      </p:nvGrpSpPr>
+      <p:grpSpPr>
+        <a:xfrm>
+          <a:off x="0" y="0"/>
+          <a:ext cx="0" cy="0"/>
+          <a:chOff x="0" y="0"/>
+          <a:chExt cx="0" cy="0"/>
+        </a:xfrm>
+      </p:grpSpPr>
+      <p:grpSp>
+        <p:nvGrpSpPr>
+          <p:cNvPr id="4" name="Group 3"/>
+          <p:cNvGrpSpPr/>
+          <p:nvPr/>
+        </p:nvGrpSpPr>
+        <p:grpSpPr>
+          <a:xfrm>
+            <a:off x="3637084" y="0"/>
+            <a:ext cx="5668108" cy="6858000"/>
+            <a:chOff x="3637084" y="0"/>
+            <a:chExt cx="5668108" cy="6858000"/>
+          </a:xfrm>
+        </p:grpSpPr>
+        <p:pic>
+          <p:nvPicPr>
+            <p:cNvPr id="2" name="Picture 1"/>
+            <p:cNvPicPr>
+              <a:picLocks noChangeAspect="1"/>
+            </p:cNvPicPr>
+            <p:nvPr/>
+          </p:nvPicPr>
+          <p:blipFill rotWithShape="1">
+            <a:blip r:embed="rId2">
+              <a:extLst>
+                <a:ext uri="{28A0092B-C50C-407E-A947-70E740481C1C}">
+                  <a14:useLocalDpi xmlns:a14="http://schemas.microsoft.com/office/drawing/2010/main" val="0"/>
+                </a:ext>
+              </a:extLst>
+            </a:blip>
+            <a:srcRect l="32107" r="32107"/>
+            <a:stretch/>
+          </p:blipFill>
+          <p:spPr>
+            <a:xfrm>
+              <a:off x="3637084" y="0"/>
+              <a:ext cx="3001108" cy="6858000"/>
+            </a:xfrm>
+            <a:prstGeom prst="rect">
+              <a:avLst/>
+            </a:prstGeom>
+          </p:spPr>
+        </p:pic>
+        <p:pic>
+          <p:nvPicPr>
+            <p:cNvPr id="3" name="Picture 2"/>
+            <p:cNvPicPr>
+              <a:picLocks noChangeAspect="1"/>
+            </p:cNvPicPr>
+            <p:nvPr/>
+          </p:nvPicPr>
+          <p:blipFill rotWithShape="1">
+            <a:blip r:embed="rId3">
+              <a:extLst>
+                <a:ext uri="{28A0092B-C50C-407E-A947-70E740481C1C}">
+                  <a14:useLocalDpi xmlns:a14="http://schemas.microsoft.com/office/drawing/2010/main" val="0"/>
+                </a:ext>
+              </a:extLst>
+            </a:blip>
+            <a:srcRect l="34099" r="34099"/>
+            <a:stretch/>
+          </p:blipFill>
+          <p:spPr>
+            <a:xfrm>
+              <a:off x="6638192" y="0"/>
+              <a:ext cx="2667000" cy="6858000"/>
+            </a:xfrm>
+            <a:prstGeom prst="rect">
+              <a:avLst/>
+            </a:prstGeom>
+          </p:spPr>
+        </p:pic>
+      </p:grpSp>
+    </p:spTree>
+    <p:extLst>
+      <p:ext uri="{BB962C8B-B14F-4D97-AF65-F5344CB8AC3E}">
+        <p14:creationId xmlns:p14="http://schemas.microsoft.com/office/powerpoint/2010/main" val="81304126"/>
+      </p:ext>
+    </p:extLst>
+  </p:cSld>
+  <p:clrMapOvr>
+    <a:masterClrMapping/>
+  </p:clrMapOvr>
+</p:sld>
+</file>
+
+<file path=ppt/slides/slide12.xml><?xml version="1.0" encoding="utf-8"?>
+<p:sld xmlns:a="http://schemas.openxmlformats.org/drawingml/2006/main" xmlns:r="http://schemas.openxmlformats.org/officeDocument/2006/relationships" xmlns:p="http://schemas.openxmlformats.org/presentationml/2006/main">
+  <p:cSld>
+    <p:spTree>
+      <p:nvGrpSpPr>
+        <p:cNvPr id="1" name=""/>
+        <p:cNvGrpSpPr/>
+        <p:nvPr/>
+      </p:nvGrpSpPr>
+      <p:grpSpPr>
+        <a:xfrm>
+          <a:off x="0" y="0"/>
+          <a:ext cx="0" cy="0"/>
+          <a:chOff x="0" y="0"/>
+          <a:chExt cx="0" cy="0"/>
+        </a:xfrm>
+      </p:grpSpPr>
+      <p:pic>
+        <p:nvPicPr>
+          <p:cNvPr id="2" name="Picture 1"/>
+          <p:cNvPicPr>
+            <a:picLocks noChangeAspect="1"/>
+          </p:cNvPicPr>
+          <p:nvPr/>
+        </p:nvPicPr>
+        <p:blipFill rotWithShape="1">
+          <a:blip r:embed="rId2">
+            <a:extLst>
+              <a:ext uri="{28A0092B-C50C-407E-A947-70E740481C1C}">
+                <a14:useLocalDpi xmlns:a14="http://schemas.microsoft.com/office/drawing/2010/main" val="0"/>
+              </a:ext>
+            </a:extLst>
+          </a:blip>
+          <a:srcRect l="29066" r="29066"/>
+          <a:stretch/>
+        </p:blipFill>
+        <p:spPr>
+          <a:xfrm>
+            <a:off x="4340469" y="0"/>
+            <a:ext cx="3511062" cy="6858000"/>
+          </a:xfrm>
+          <a:prstGeom prst="rect">
+            <a:avLst/>
+          </a:prstGeom>
+        </p:spPr>
+      </p:pic>
+    </p:spTree>
+    <p:extLst>
+      <p:ext uri="{BB962C8B-B14F-4D97-AF65-F5344CB8AC3E}">
+        <p14:creationId xmlns:p14="http://schemas.microsoft.com/office/powerpoint/2010/main" val="14310191"/>
+      </p:ext>
+    </p:extLst>
+  </p:cSld>
+  <p:clrMapOvr>
+    <a:masterClrMapping/>
+  </p:clrMapOvr>
+</p:sld>
+</file>
+
+<file path=ppt/slides/slide13.xml><?xml version="1.0" encoding="utf-8"?>
+<p:sld xmlns:a="http://schemas.openxmlformats.org/drawingml/2006/main" xmlns:r="http://schemas.openxmlformats.org/officeDocument/2006/relationships" xmlns:p="http://schemas.openxmlformats.org/presentationml/2006/main">
+  <p:cSld>
+    <p:spTree>
+      <p:nvGrpSpPr>
+        <p:cNvPr id="1" name=""/>
+        <p:cNvGrpSpPr/>
+        <p:nvPr/>
+      </p:nvGrpSpPr>
+      <p:grpSpPr>
+        <a:xfrm>
+          <a:off x="0" y="0"/>
+          <a:ext cx="0" cy="0"/>
+          <a:chOff x="0" y="0"/>
+          <a:chExt cx="0" cy="0"/>
+        </a:xfrm>
+      </p:grpSpPr>
+      <p:pic>
+        <p:nvPicPr>
+          <p:cNvPr id="2" name="Picture 1"/>
+          <p:cNvPicPr>
+            <a:picLocks noChangeAspect="1"/>
+          </p:cNvPicPr>
+          <p:nvPr/>
+        </p:nvPicPr>
+        <p:blipFill rotWithShape="1">
+          <a:blip r:embed="rId2">
+            <a:extLst>
+              <a:ext uri="{28A0092B-C50C-407E-A947-70E740481C1C}">
+                <a14:useLocalDpi xmlns:a14="http://schemas.microsoft.com/office/drawing/2010/main" val="0"/>
+              </a:ext>
+            </a:extLst>
+          </a:blip>
+          <a:srcRect l="29591" r="29591"/>
+          <a:stretch/>
+        </p:blipFill>
+        <p:spPr>
+          <a:xfrm>
+            <a:off x="4384431" y="0"/>
+            <a:ext cx="3423138" cy="6858000"/>
+          </a:xfrm>
+          <a:prstGeom prst="rect">
+            <a:avLst/>
+          </a:prstGeom>
+        </p:spPr>
+      </p:pic>
+    </p:spTree>
+    <p:extLst>
+      <p:ext uri="{BB962C8B-B14F-4D97-AF65-F5344CB8AC3E}">
+        <p14:creationId xmlns:p14="http://schemas.microsoft.com/office/powerpoint/2010/main" val="3071793619"/>
+      </p:ext>
+    </p:extLst>
+  </p:cSld>
+  <p:clrMapOvr>
+    <a:masterClrMapping/>
+  </p:clrMapOvr>
 </p:sld>
 </file>
 
@@ -3248,6 +3584,13 @@
   <p:clrMapOvr>
     <a:masterClrMapping/>
   </p:clrMapOvr>
+  <p:timing>
+    <p:tnLst>
+      <p:par>
+        <p:cTn id="1" dur="indefinite" restart="never" nodeType="tmRoot"/>
+      </p:par>
+    </p:tnLst>
+  </p:timing>
 </p:sld>
 </file>
 
@@ -3819,6 +4162,65 @@
           <a:chExt cx="0" cy="0"/>
         </a:xfrm>
       </p:grpSpPr>
+      <p:pic>
+        <p:nvPicPr>
+          <p:cNvPr id="2" name="Picture 1"/>
+          <p:cNvPicPr>
+            <a:picLocks noChangeAspect="1"/>
+          </p:cNvPicPr>
+          <p:nvPr/>
+        </p:nvPicPr>
+        <p:blipFill rotWithShape="1">
+          <a:blip r:embed="rId2">
+            <a:extLst>
+              <a:ext uri="{28A0092B-C50C-407E-A947-70E740481C1C}">
+                <a14:useLocalDpi xmlns:a14="http://schemas.microsoft.com/office/drawing/2010/main" val="0"/>
+              </a:ext>
+            </a:extLst>
+          </a:blip>
+          <a:srcRect l="20586" t="14487" r="20586" b="14487"/>
+          <a:stretch/>
+        </p:blipFill>
+        <p:spPr>
+          <a:xfrm>
+            <a:off x="3188676" y="993531"/>
+            <a:ext cx="5814648" cy="4870938"/>
+          </a:xfrm>
+          <a:prstGeom prst="rect">
+            <a:avLst/>
+          </a:prstGeom>
+        </p:spPr>
+      </p:pic>
+    </p:spTree>
+    <p:extLst>
+      <p:ext uri="{BB962C8B-B14F-4D97-AF65-F5344CB8AC3E}">
+        <p14:creationId xmlns:p14="http://schemas.microsoft.com/office/powerpoint/2010/main" val="2107809465"/>
+      </p:ext>
+    </p:extLst>
+  </p:cSld>
+  <p:clrMapOvr>
+    <a:masterClrMapping/>
+  </p:clrMapOvr>
+</p:sld>
+</file>
+
+<file path=ppt/slides/slide5.xml><?xml version="1.0" encoding="utf-8"?>
+<p:sld xmlns:a="http://schemas.openxmlformats.org/drawingml/2006/main" xmlns:r="http://schemas.openxmlformats.org/officeDocument/2006/relationships" xmlns:p="http://schemas.openxmlformats.org/presentationml/2006/main">
+  <p:cSld>
+    <p:spTree>
+      <p:nvGrpSpPr>
+        <p:cNvPr id="1" name=""/>
+        <p:cNvGrpSpPr/>
+        <p:nvPr/>
+      </p:nvGrpSpPr>
+      <p:grpSpPr>
+        <a:xfrm>
+          <a:off x="0" y="0"/>
+          <a:ext cx="0" cy="0"/>
+          <a:chOff x="0" y="0"/>
+          <a:chExt cx="0" cy="0"/>
+        </a:xfrm>
+      </p:grpSpPr>
       <p:grpSp>
         <p:nvGrpSpPr>
           <p:cNvPr id="4" name="Group 3"/>
@@ -3905,7 +4307,7 @@
 </p:sld>
 </file>
 
-<file path=ppt/slides/slide5.xml><?xml version="1.0" encoding="utf-8"?>
+<file path=ppt/slides/slide6.xml><?xml version="1.0" encoding="utf-8"?>
 <p:sld xmlns:a="http://schemas.openxmlformats.org/drawingml/2006/main" xmlns:r="http://schemas.openxmlformats.org/officeDocument/2006/relationships" xmlns:p="http://schemas.openxmlformats.org/presentationml/2006/main">
   <p:cSld>
     <p:spTree>
@@ -3964,7 +4366,7 @@
 </p:sld>
 </file>
 
-<file path=ppt/slides/slide6.xml><?xml version="1.0" encoding="utf-8"?>
+<file path=ppt/slides/slide7.xml><?xml version="1.0" encoding="utf-8"?>
 <p:sld xmlns:a="http://schemas.openxmlformats.org/drawingml/2006/main" xmlns:r="http://schemas.openxmlformats.org/officeDocument/2006/relationships" xmlns:p="http://schemas.openxmlformats.org/presentationml/2006/main">
   <p:cSld>
     <p:spTree>
@@ -4067,7 +4469,7 @@
 </p:sld>
 </file>
 
-<file path=ppt/slides/slide7.xml><?xml version="1.0" encoding="utf-8"?>
+<file path=ppt/slides/slide8.xml><?xml version="1.0" encoding="utf-8"?>
 <p:sld xmlns:a="http://schemas.openxmlformats.org/drawingml/2006/main" xmlns:r="http://schemas.openxmlformats.org/officeDocument/2006/relationships" xmlns:p="http://schemas.openxmlformats.org/presentationml/2006/main">
   <p:cSld>
     <p:spTree>
@@ -4170,7 +4572,7 @@
 </p:sld>
 </file>
 
-<file path=ppt/slides/slide8.xml><?xml version="1.0" encoding="utf-8"?>
+<file path=ppt/slides/slide9.xml><?xml version="1.0" encoding="utf-8"?>
 <p:sld xmlns:a="http://schemas.openxmlformats.org/drawingml/2006/main" xmlns:r="http://schemas.openxmlformats.org/officeDocument/2006/relationships" xmlns:p="http://schemas.openxmlformats.org/presentationml/2006/main">
   <p:cSld>
     <p:spTree>

</xml_diff>